<commit_message>
building a ChronicleStampedLock.java reference implementation in the RFC repo.
</commit_message>
<xml_diff>
--- a/ChroncileStampedLock/Chronicle=RFC.pptx
+++ b/ChroncileStampedLock/Chronicle=RFC.pptx
@@ -263,7 +263,7 @@
           <a:p>
             <a:fld id="{AC27DF5B-FC35-4261-A80E-D864790832D3}" type="datetimeFigureOut">
               <a:rPr lang="en-US" smtClean="0"/>
-              <a:t>7/14/2020</a:t>
+              <a:t>7/18/2020</a:t>
             </a:fld>
             <a:endParaRPr lang="en-US"/>
           </a:p>
@@ -461,7 +461,7 @@
           <a:p>
             <a:fld id="{AC27DF5B-FC35-4261-A80E-D864790832D3}" type="datetimeFigureOut">
               <a:rPr lang="en-US" smtClean="0"/>
-              <a:t>7/14/2020</a:t>
+              <a:t>7/18/2020</a:t>
             </a:fld>
             <a:endParaRPr lang="en-US"/>
           </a:p>
@@ -669,7 +669,7 @@
           <a:p>
             <a:fld id="{AC27DF5B-FC35-4261-A80E-D864790832D3}" type="datetimeFigureOut">
               <a:rPr lang="en-US" smtClean="0"/>
-              <a:t>7/14/2020</a:t>
+              <a:t>7/18/2020</a:t>
             </a:fld>
             <a:endParaRPr lang="en-US"/>
           </a:p>
@@ -867,7 +867,7 @@
           <a:p>
             <a:fld id="{AC27DF5B-FC35-4261-A80E-D864790832D3}" type="datetimeFigureOut">
               <a:rPr lang="en-US" smtClean="0"/>
-              <a:t>7/14/2020</a:t>
+              <a:t>7/18/2020</a:t>
             </a:fld>
             <a:endParaRPr lang="en-US"/>
           </a:p>
@@ -1142,7 +1142,7 @@
           <a:p>
             <a:fld id="{AC27DF5B-FC35-4261-A80E-D864790832D3}" type="datetimeFigureOut">
               <a:rPr lang="en-US" smtClean="0"/>
-              <a:t>7/14/2020</a:t>
+              <a:t>7/18/2020</a:t>
             </a:fld>
             <a:endParaRPr lang="en-US"/>
           </a:p>
@@ -1407,7 +1407,7 @@
           <a:p>
             <a:fld id="{AC27DF5B-FC35-4261-A80E-D864790832D3}" type="datetimeFigureOut">
               <a:rPr lang="en-US" smtClean="0"/>
-              <a:t>7/14/2020</a:t>
+              <a:t>7/18/2020</a:t>
             </a:fld>
             <a:endParaRPr lang="en-US"/>
           </a:p>
@@ -1819,7 +1819,7 @@
           <a:p>
             <a:fld id="{AC27DF5B-FC35-4261-A80E-D864790832D3}" type="datetimeFigureOut">
               <a:rPr lang="en-US" smtClean="0"/>
-              <a:t>7/14/2020</a:t>
+              <a:t>7/18/2020</a:t>
             </a:fld>
             <a:endParaRPr lang="en-US"/>
           </a:p>
@@ -1960,7 +1960,7 @@
           <a:p>
             <a:fld id="{AC27DF5B-FC35-4261-A80E-D864790832D3}" type="datetimeFigureOut">
               <a:rPr lang="en-US" smtClean="0"/>
-              <a:t>7/14/2020</a:t>
+              <a:t>7/18/2020</a:t>
             </a:fld>
             <a:endParaRPr lang="en-US"/>
           </a:p>
@@ -2073,7 +2073,7 @@
           <a:p>
             <a:fld id="{AC27DF5B-FC35-4261-A80E-D864790832D3}" type="datetimeFigureOut">
               <a:rPr lang="en-US" smtClean="0"/>
-              <a:t>7/14/2020</a:t>
+              <a:t>7/18/2020</a:t>
             </a:fld>
             <a:endParaRPr lang="en-US"/>
           </a:p>
@@ -2384,7 +2384,7 @@
           <a:p>
             <a:fld id="{AC27DF5B-FC35-4261-A80E-D864790832D3}" type="datetimeFigureOut">
               <a:rPr lang="en-US" smtClean="0"/>
-              <a:t>7/14/2020</a:t>
+              <a:t>7/18/2020</a:t>
             </a:fld>
             <a:endParaRPr lang="en-US"/>
           </a:p>
@@ -2672,7 +2672,7 @@
           <a:p>
             <a:fld id="{AC27DF5B-FC35-4261-A80E-D864790832D3}" type="datetimeFigureOut">
               <a:rPr lang="en-US" smtClean="0"/>
-              <a:t>7/14/2020</a:t>
+              <a:t>7/18/2020</a:t>
             </a:fld>
             <a:endParaRPr lang="en-US"/>
           </a:p>
@@ -2913,7 +2913,7 @@
           <a:p>
             <a:fld id="{AC27DF5B-FC35-4261-A80E-D864790832D3}" type="datetimeFigureOut">
               <a:rPr lang="en-US" smtClean="0"/>
-              <a:t>7/14/2020</a:t>
+              <a:t>7/18/2020</a:t>
             </a:fld>
             <a:endParaRPr lang="en-US"/>
           </a:p>
@@ -3376,7 +3376,7 @@
           <a:bodyPr/>
           <a:lstStyle/>
           <a:p>
-            <a:endParaRPr lang="en-US"/>
+            <a:endParaRPr lang="en-US" dirty="0"/>
           </a:p>
         </p:txBody>
       </p:sp>
@@ -5318,36 +5318,6 @@
           </a:extLst>
         </p:spPr>
       </p:pic>
-      <p:pic>
-        <p:nvPicPr>
-          <p:cNvPr id="6" name="Picture 5">
-            <a:extLst>
-              <a:ext uri="{FF2B5EF4-FFF2-40B4-BE49-F238E27FC236}">
-                <a16:creationId xmlns:a16="http://schemas.microsoft.com/office/drawing/2014/main" id="{FA858650-57E2-422C-9E42-8E0A8231E3E4}"/>
-              </a:ext>
-            </a:extLst>
-          </p:cNvPr>
-          <p:cNvPicPr>
-            <a:picLocks noChangeAspect="1"/>
-          </p:cNvPicPr>
-          <p:nvPr/>
-        </p:nvPicPr>
-        <p:blipFill>
-          <a:blip r:embed="rId3"/>
-          <a:stretch>
-            <a:fillRect/>
-          </a:stretch>
-        </p:blipFill>
-        <p:spPr>
-          <a:xfrm>
-            <a:off x="273276" y="457441"/>
-            <a:ext cx="11820525" cy="5717268"/>
-          </a:xfrm>
-          <a:prstGeom prst="rect">
-            <a:avLst/>
-          </a:prstGeom>
-        </p:spPr>
-      </p:pic>
       <p:sp>
         <p:nvSpPr>
           <p:cNvPr id="7" name="Arrow: Left 6">
@@ -5425,6 +5395,134 @@
             <a:r>
               <a:rPr lang="en-US" dirty="0"/>
               <a:t>@t = 3</a:t>
+            </a:r>
+          </a:p>
+        </p:txBody>
+      </p:sp>
+      <p:pic>
+        <p:nvPicPr>
+          <p:cNvPr id="2" name="Picture 1">
+            <a:extLst>
+              <a:ext uri="{FF2B5EF4-FFF2-40B4-BE49-F238E27FC236}">
+                <a16:creationId xmlns:a16="http://schemas.microsoft.com/office/drawing/2014/main" id="{130C1478-AA65-439E-B8C1-EAD5843B66F4}"/>
+              </a:ext>
+            </a:extLst>
+          </p:cNvPr>
+          <p:cNvPicPr>
+            <a:picLocks noChangeAspect="1"/>
+          </p:cNvPicPr>
+          <p:nvPr/>
+        </p:nvPicPr>
+        <p:blipFill>
+          <a:blip r:embed="rId3"/>
+          <a:stretch>
+            <a:fillRect/>
+          </a:stretch>
+        </p:blipFill>
+        <p:spPr>
+          <a:xfrm>
+            <a:off x="636134" y="-14515"/>
+            <a:ext cx="11253562" cy="5842228"/>
+          </a:xfrm>
+          <a:prstGeom prst="rect">
+            <a:avLst/>
+          </a:prstGeom>
+        </p:spPr>
+      </p:pic>
+      <p:sp>
+        <p:nvSpPr>
+          <p:cNvPr id="3" name="Arrow: Left 2">
+            <a:extLst>
+              <a:ext uri="{FF2B5EF4-FFF2-40B4-BE49-F238E27FC236}">
+                <a16:creationId xmlns:a16="http://schemas.microsoft.com/office/drawing/2014/main" id="{68F014F0-64A0-4680-BFDD-F3C37614BFD0}"/>
+              </a:ext>
+            </a:extLst>
+          </p:cNvPr>
+          <p:cNvSpPr/>
+          <p:nvPr/>
+        </p:nvSpPr>
+        <p:spPr>
+          <a:xfrm>
+            <a:off x="7286171" y="4249056"/>
+            <a:ext cx="1494972" cy="391885"/>
+          </a:xfrm>
+          <a:prstGeom prst="leftArrow">
+            <a:avLst/>
+          </a:prstGeom>
+        </p:spPr>
+        <p:style>
+          <a:lnRef idx="2">
+            <a:schemeClr val="accent1">
+              <a:shade val="50000"/>
+            </a:schemeClr>
+          </a:lnRef>
+          <a:fillRef idx="1">
+            <a:schemeClr val="accent1"/>
+          </a:fillRef>
+          <a:effectRef idx="0">
+            <a:schemeClr val="accent1"/>
+          </a:effectRef>
+          <a:fontRef idx="minor">
+            <a:schemeClr val="lt1"/>
+          </a:fontRef>
+        </p:style>
+        <p:txBody>
+          <a:bodyPr rtlCol="0" anchor="ctr"/>
+          <a:lstStyle/>
+          <a:p>
+            <a:pPr algn="ctr"/>
+            <a:r>
+              <a:rPr lang="en-US" dirty="0"/>
+              <a:t>@t=2</a:t>
+            </a:r>
+          </a:p>
+        </p:txBody>
+      </p:sp>
+      <p:sp>
+        <p:nvSpPr>
+          <p:cNvPr id="11" name="Arrow: Left 10">
+            <a:extLst>
+              <a:ext uri="{FF2B5EF4-FFF2-40B4-BE49-F238E27FC236}">
+                <a16:creationId xmlns:a16="http://schemas.microsoft.com/office/drawing/2014/main" id="{30F4E7DD-09A1-4098-A07C-060B84766FD6}"/>
+              </a:ext>
+            </a:extLst>
+          </p:cNvPr>
+          <p:cNvSpPr/>
+          <p:nvPr/>
+        </p:nvSpPr>
+        <p:spPr>
+          <a:xfrm>
+            <a:off x="5145314" y="2050141"/>
+            <a:ext cx="1494972" cy="391885"/>
+          </a:xfrm>
+          <a:prstGeom prst="leftArrow">
+            <a:avLst/>
+          </a:prstGeom>
+        </p:spPr>
+        <p:style>
+          <a:lnRef idx="2">
+            <a:schemeClr val="accent1">
+              <a:shade val="50000"/>
+            </a:schemeClr>
+          </a:lnRef>
+          <a:fillRef idx="1">
+            <a:schemeClr val="accent1"/>
+          </a:fillRef>
+          <a:effectRef idx="0">
+            <a:schemeClr val="accent1"/>
+          </a:effectRef>
+          <a:fontRef idx="minor">
+            <a:schemeClr val="lt1"/>
+          </a:fontRef>
+        </p:style>
+        <p:txBody>
+          <a:bodyPr rtlCol="0" anchor="ctr"/>
+          <a:lstStyle/>
+          <a:p>
+            <a:pPr algn="ctr"/>
+            <a:r>
+              <a:rPr lang="en-US" dirty="0"/>
+              <a:t>@t=0</a:t>
             </a:r>
           </a:p>
         </p:txBody>
@@ -5508,10 +5606,10 @@
       </p:pic>
       <p:pic>
         <p:nvPicPr>
-          <p:cNvPr id="7" name="Picture 6">
-            <a:extLst>
-              <a:ext uri="{FF2B5EF4-FFF2-40B4-BE49-F238E27FC236}">
-                <a16:creationId xmlns:a16="http://schemas.microsoft.com/office/drawing/2014/main" id="{6B3CB477-BBE5-4836-B7ED-A256F254471F}"/>
+          <p:cNvPr id="4" name="Picture 3">
+            <a:extLst>
+              <a:ext uri="{FF2B5EF4-FFF2-40B4-BE49-F238E27FC236}">
+                <a16:creationId xmlns:a16="http://schemas.microsoft.com/office/drawing/2014/main" id="{78090BDC-C032-4346-9960-5B9F2D336BE5}"/>
               </a:ext>
             </a:extLst>
           </p:cNvPr>
@@ -5528,8 +5626,8 @@
         </p:blipFill>
         <p:spPr>
           <a:xfrm>
-            <a:off x="423862" y="377371"/>
-            <a:ext cx="11344275" cy="5797338"/>
+            <a:off x="1824037" y="435428"/>
+            <a:ext cx="9420225" cy="5486400"/>
           </a:xfrm>
           <a:prstGeom prst="rect">
             <a:avLst/>
@@ -5538,10 +5636,10 @@
       </p:pic>
       <p:sp>
         <p:nvSpPr>
-          <p:cNvPr id="9" name="Arrow: Left 8">
-            <a:extLst>
-              <a:ext uri="{FF2B5EF4-FFF2-40B4-BE49-F238E27FC236}">
-                <a16:creationId xmlns:a16="http://schemas.microsoft.com/office/drawing/2014/main" id="{A4FECA26-55F6-4EF6-B4A3-1F261350EDD2}"/>
+          <p:cNvPr id="8" name="Arrow: Left 7">
+            <a:extLst>
+              <a:ext uri="{FF2B5EF4-FFF2-40B4-BE49-F238E27FC236}">
+                <a16:creationId xmlns:a16="http://schemas.microsoft.com/office/drawing/2014/main" id="{80A8AF85-F8FA-4713-B847-736001677D0D}"/>
               </a:ext>
             </a:extLst>
           </p:cNvPr>
@@ -5550,7 +5648,7 @@
         </p:nvSpPr>
         <p:spPr>
           <a:xfrm>
-            <a:off x="8853714" y="3643086"/>
+            <a:off x="7427005" y="3429000"/>
             <a:ext cx="1494972" cy="391885"/>
           </a:xfrm>
           <a:prstGeom prst="leftArrow">
@@ -5578,7 +5676,108 @@
           <a:lstStyle/>
           <a:p>
             <a:pPr algn="ctr"/>
-            <a:endParaRPr lang="en-US"/>
+            <a:r>
+              <a:rPr lang="en-US" dirty="0"/>
+              <a:t>@t=1</a:t>
+            </a:r>
+          </a:p>
+        </p:txBody>
+      </p:sp>
+      <p:sp>
+        <p:nvSpPr>
+          <p:cNvPr id="13" name="Arrow: Left 12">
+            <a:extLst>
+              <a:ext uri="{FF2B5EF4-FFF2-40B4-BE49-F238E27FC236}">
+                <a16:creationId xmlns:a16="http://schemas.microsoft.com/office/drawing/2014/main" id="{B3EDAE89-3E34-4094-8F08-70AF0C547B8A}"/>
+              </a:ext>
+            </a:extLst>
+          </p:cNvPr>
+          <p:cNvSpPr/>
+          <p:nvPr/>
+        </p:nvSpPr>
+        <p:spPr>
+          <a:xfrm>
+            <a:off x="7724547" y="2159000"/>
+            <a:ext cx="1494972" cy="391885"/>
+          </a:xfrm>
+          <a:prstGeom prst="leftArrow">
+            <a:avLst/>
+          </a:prstGeom>
+        </p:spPr>
+        <p:style>
+          <a:lnRef idx="2">
+            <a:schemeClr val="accent1">
+              <a:shade val="50000"/>
+            </a:schemeClr>
+          </a:lnRef>
+          <a:fillRef idx="1">
+            <a:schemeClr val="accent1"/>
+          </a:fillRef>
+          <a:effectRef idx="0">
+            <a:schemeClr val="accent1"/>
+          </a:effectRef>
+          <a:fontRef idx="minor">
+            <a:schemeClr val="lt1"/>
+          </a:fontRef>
+        </p:style>
+        <p:txBody>
+          <a:bodyPr rtlCol="0" anchor="ctr"/>
+          <a:lstStyle/>
+          <a:p>
+            <a:pPr algn="ctr"/>
+            <a:r>
+              <a:rPr lang="en-US" dirty="0"/>
+              <a:t>@t=0</a:t>
+            </a:r>
+          </a:p>
+        </p:txBody>
+      </p:sp>
+      <p:sp>
+        <p:nvSpPr>
+          <p:cNvPr id="14" name="Arrow: Left 13">
+            <a:extLst>
+              <a:ext uri="{FF2B5EF4-FFF2-40B4-BE49-F238E27FC236}">
+                <a16:creationId xmlns:a16="http://schemas.microsoft.com/office/drawing/2014/main" id="{1ADC4F8E-83D9-425C-B3A8-261A3B38E602}"/>
+              </a:ext>
+            </a:extLst>
+          </p:cNvPr>
+          <p:cNvSpPr/>
+          <p:nvPr/>
+        </p:nvSpPr>
+        <p:spPr>
+          <a:xfrm>
+            <a:off x="9749290" y="4655457"/>
+            <a:ext cx="1494972" cy="391885"/>
+          </a:xfrm>
+          <a:prstGeom prst="leftArrow">
+            <a:avLst/>
+          </a:prstGeom>
+        </p:spPr>
+        <p:style>
+          <a:lnRef idx="2">
+            <a:schemeClr val="accent1">
+              <a:shade val="50000"/>
+            </a:schemeClr>
+          </a:lnRef>
+          <a:fillRef idx="1">
+            <a:schemeClr val="accent1"/>
+          </a:fillRef>
+          <a:effectRef idx="0">
+            <a:schemeClr val="accent1"/>
+          </a:effectRef>
+          <a:fontRef idx="minor">
+            <a:schemeClr val="lt1"/>
+          </a:fontRef>
+        </p:style>
+        <p:txBody>
+          <a:bodyPr rtlCol="0" anchor="ctr"/>
+          <a:lstStyle/>
+          <a:p>
+            <a:pPr algn="ctr"/>
+            <a:r>
+              <a:rPr lang="en-US" dirty="0"/>
+              <a:t>@t &gt;= 3</a:t>
+            </a:r>
           </a:p>
         </p:txBody>
       </p:sp>
@@ -5661,10 +5860,10 @@
       </p:pic>
       <p:pic>
         <p:nvPicPr>
-          <p:cNvPr id="3" name="Picture 2">
-            <a:extLst>
-              <a:ext uri="{FF2B5EF4-FFF2-40B4-BE49-F238E27FC236}">
-                <a16:creationId xmlns:a16="http://schemas.microsoft.com/office/drawing/2014/main" id="{D40ED3E3-00F1-4DD3-9C89-41CC9E853C8C}"/>
+          <p:cNvPr id="5" name="Picture 4">
+            <a:extLst>
+              <a:ext uri="{FF2B5EF4-FFF2-40B4-BE49-F238E27FC236}">
+                <a16:creationId xmlns:a16="http://schemas.microsoft.com/office/drawing/2014/main" id="{4DE9E614-6BEB-4A34-9492-39D4B044C05C}"/>
               </a:ext>
             </a:extLst>
           </p:cNvPr>
@@ -5681,8 +5880,8 @@
         </p:blipFill>
         <p:spPr>
           <a:xfrm>
-            <a:off x="376237" y="145143"/>
-            <a:ext cx="11439525" cy="5892800"/>
+            <a:off x="-92301" y="0"/>
+            <a:ext cx="12011025" cy="6125027"/>
           </a:xfrm>
           <a:prstGeom prst="rect">
             <a:avLst/>
@@ -5691,10 +5890,10 @@
       </p:pic>
       <p:sp>
         <p:nvSpPr>
-          <p:cNvPr id="4" name="Arrow: Left 3">
-            <a:extLst>
-              <a:ext uri="{FF2B5EF4-FFF2-40B4-BE49-F238E27FC236}">
-                <a16:creationId xmlns:a16="http://schemas.microsoft.com/office/drawing/2014/main" id="{3BB26AB2-00E1-4B0E-A67E-50D1CA3B14E4}"/>
+          <p:cNvPr id="7" name="Arrow: Left 6">
+            <a:extLst>
+              <a:ext uri="{FF2B5EF4-FFF2-40B4-BE49-F238E27FC236}">
+                <a16:creationId xmlns:a16="http://schemas.microsoft.com/office/drawing/2014/main" id="{7E96FEDD-3568-4038-9CF9-7FCE4E2FAC6B}"/>
               </a:ext>
             </a:extLst>
           </p:cNvPr>
@@ -5703,7 +5902,7 @@
         </p:nvSpPr>
         <p:spPr>
           <a:xfrm>
-            <a:off x="7997371" y="3607920"/>
+            <a:off x="5289096" y="2844799"/>
             <a:ext cx="1248229" cy="435428"/>
           </a:xfrm>
           <a:prstGeom prst="leftArrow">
@@ -5731,7 +5930,108 @@
           <a:lstStyle/>
           <a:p>
             <a:pPr algn="ctr"/>
-            <a:endParaRPr lang="en-US"/>
+            <a:r>
+              <a:rPr lang="en-US" dirty="0"/>
+              <a:t>@t=1</a:t>
+            </a:r>
+          </a:p>
+        </p:txBody>
+      </p:sp>
+      <p:sp>
+        <p:nvSpPr>
+          <p:cNvPr id="8" name="Arrow: Left 7">
+            <a:extLst>
+              <a:ext uri="{FF2B5EF4-FFF2-40B4-BE49-F238E27FC236}">
+                <a16:creationId xmlns:a16="http://schemas.microsoft.com/office/drawing/2014/main" id="{CF3CF50D-3261-4F9F-AD24-503F8DE06E20}"/>
+              </a:ext>
+            </a:extLst>
+          </p:cNvPr>
+          <p:cNvSpPr/>
+          <p:nvPr/>
+        </p:nvSpPr>
+        <p:spPr>
+          <a:xfrm>
+            <a:off x="5913210" y="1132113"/>
+            <a:ext cx="1248229" cy="435428"/>
+          </a:xfrm>
+          <a:prstGeom prst="leftArrow">
+            <a:avLst/>
+          </a:prstGeom>
+        </p:spPr>
+        <p:style>
+          <a:lnRef idx="2">
+            <a:schemeClr val="accent1">
+              <a:shade val="50000"/>
+            </a:schemeClr>
+          </a:lnRef>
+          <a:fillRef idx="1">
+            <a:schemeClr val="accent1"/>
+          </a:fillRef>
+          <a:effectRef idx="0">
+            <a:schemeClr val="accent1"/>
+          </a:effectRef>
+          <a:fontRef idx="minor">
+            <a:schemeClr val="lt1"/>
+          </a:fontRef>
+        </p:style>
+        <p:txBody>
+          <a:bodyPr rtlCol="0" anchor="ctr"/>
+          <a:lstStyle/>
+          <a:p>
+            <a:pPr algn="ctr"/>
+            <a:r>
+              <a:rPr lang="en-US" dirty="0"/>
+              <a:t>@t=0</a:t>
+            </a:r>
+          </a:p>
+        </p:txBody>
+      </p:sp>
+      <p:sp>
+        <p:nvSpPr>
+          <p:cNvPr id="11" name="Arrow: Left 10">
+            <a:extLst>
+              <a:ext uri="{FF2B5EF4-FFF2-40B4-BE49-F238E27FC236}">
+                <a16:creationId xmlns:a16="http://schemas.microsoft.com/office/drawing/2014/main" id="{EDD16502-F580-4DA9-A1DA-236B9B12BB2D}"/>
+              </a:ext>
+            </a:extLst>
+          </p:cNvPr>
+          <p:cNvSpPr/>
+          <p:nvPr/>
+        </p:nvSpPr>
+        <p:spPr>
+          <a:xfrm>
+            <a:off x="3438524" y="4535713"/>
+            <a:ext cx="1248229" cy="435428"/>
+          </a:xfrm>
+          <a:prstGeom prst="leftArrow">
+            <a:avLst/>
+          </a:prstGeom>
+        </p:spPr>
+        <p:style>
+          <a:lnRef idx="2">
+            <a:schemeClr val="accent1">
+              <a:shade val="50000"/>
+            </a:schemeClr>
+          </a:lnRef>
+          <a:fillRef idx="1">
+            <a:schemeClr val="accent1"/>
+          </a:fillRef>
+          <a:effectRef idx="0">
+            <a:schemeClr val="accent1"/>
+          </a:effectRef>
+          <a:fontRef idx="minor">
+            <a:schemeClr val="lt1"/>
+          </a:fontRef>
+        </p:style>
+        <p:txBody>
+          <a:bodyPr rtlCol="0" anchor="ctr"/>
+          <a:lstStyle/>
+          <a:p>
+            <a:pPr algn="ctr"/>
+            <a:r>
+              <a:rPr lang="en-US" dirty="0"/>
+              <a:t>@t &gt;= 3</a:t>
+            </a:r>
           </a:p>
         </p:txBody>
       </p:sp>

</xml_diff>